<commit_message>
Fixed logical error in quiz
</commit_message>
<xml_diff>
--- a/Projects/BS5/Foundation - Introuction to HTML and Bootstrap.pptx
+++ b/Projects/BS5/Foundation - Introuction to HTML and Bootstrap.pptx
@@ -113,6 +113,11 @@
       </a:defRPr>
     </a:lvl9pPr>
   </p:defaultTextStyle>
+  <p:extLst>
+    <p:ext uri="{EFAFB233-063F-42B5-8137-9DF3F51BA10A}">
+      <p15:sldGuideLst xmlns:p15="http://schemas.microsoft.com/office/powerpoint/2012/main"/>
+    </p:ext>
+  </p:extLst>
 </p:presentation>
 </file>
 
@@ -4057,13 +4062,7 @@
             <a:pPr lvl="2"/>
             <a:r>
               <a:rPr lang="en-US" dirty="0"/>
-              <a:t>&lt;&gt;&lt;/&gt;</a:t>
-            </a:r>
-          </a:p>
-          <a:p>
-            <a:r>
-              <a:rPr lang="en-US" dirty="0"/>
-              <a:t>An HTML document has a structured format </a:t>
+              <a:t>&lt;div&gt;&lt;div/&gt; An HTML document has a structured format </a:t>
             </a:r>
           </a:p>
           <a:p>
@@ -4167,14 +4166,7 @@
           <a:p>
             <a:r>
               <a:rPr lang="en-US" dirty="0"/>
-              <a:t>&lt;html&gt;</a:t>
-            </a:r>
-          </a:p>
-          <a:p>
-            <a:pPr lvl="1"/>
-            <a:r>
-              <a:rPr lang="en-US" dirty="0"/>
-              <a:t>: The root element that contains the entire HTML document.</a:t>
+              <a:t>&lt;html&gt; : The root element that contains the entire HTML document.</a:t>
             </a:r>
           </a:p>
           <a:p>
@@ -4391,7 +4383,9 @@
         </p:nvSpPr>
         <p:spPr/>
         <p:txBody>
-          <a:bodyPr/>
+          <a:bodyPr>
+            <a:normAutofit fontScale="85000" lnSpcReduction="20000"/>
+          </a:bodyPr>
           <a:lstStyle/>
           <a:p>
             <a:pPr marL="0" indent="0">
@@ -4401,6 +4395,69 @@
               <a:rPr lang="en-US" dirty="0"/>
               <a:t>The &lt;body&gt; section contains the visible content of the web page.</a:t>
             </a:r>
+          </a:p>
+          <a:p>
+            <a:pPr marL="0" indent="0">
+              <a:buNone/>
+            </a:pPr>
+            <a:r>
+              <a:rPr lang="en-US" dirty="0"/>
+              <a:t>&lt;body&gt;</a:t>
+            </a:r>
+          </a:p>
+          <a:p>
+            <a:pPr marL="0" indent="0">
+              <a:buNone/>
+            </a:pPr>
+            <a:endParaRPr lang="en-US" dirty="0"/>
+          </a:p>
+          <a:p>
+            <a:pPr marL="0" indent="0">
+              <a:buNone/>
+            </a:pPr>
+            <a:r>
+              <a:rPr lang="en-US" dirty="0"/>
+              <a:t>&lt;div&gt;</a:t>
+            </a:r>
+          </a:p>
+          <a:p>
+            <a:pPr marL="0" indent="0">
+              <a:buNone/>
+            </a:pPr>
+            <a:r>
+              <a:rPr lang="en-US" dirty="0"/>
+              <a:t>&lt;h1&gt;test&lt;/h1&gt;</a:t>
+            </a:r>
+          </a:p>
+          <a:p>
+            <a:pPr marL="0" indent="0">
+              <a:buNone/>
+            </a:pPr>
+            <a:r>
+              <a:rPr lang="en-US" dirty="0"/>
+              <a:t>&lt;/div&gt;</a:t>
+            </a:r>
+          </a:p>
+          <a:p>
+            <a:pPr marL="0" indent="0">
+              <a:buNone/>
+            </a:pPr>
+            <a:endParaRPr lang="en-US" dirty="0"/>
+          </a:p>
+          <a:p>
+            <a:pPr marL="0" indent="0">
+              <a:buNone/>
+            </a:pPr>
+            <a:r>
+              <a:rPr lang="en-US" dirty="0"/>
+              <a:t>&lt;/body&gt;</a:t>
+            </a:r>
+          </a:p>
+          <a:p>
+            <a:pPr marL="0" indent="0">
+              <a:buNone/>
+            </a:pPr>
+            <a:endParaRPr lang="en-US" dirty="0"/>
           </a:p>
           <a:p>
             <a:r>
@@ -4628,7 +4685,15 @@
             </a:pPr>
             <a:r>
               <a:rPr lang="en-US" dirty="0"/>
-              <a:t>Examples: &lt;h1&gt;, &lt;p&gt;, &lt;a&gt;, &lt;ul&gt;, &lt;li&gt;, &lt;div&gt;, etc.</a:t>
+              <a:t>Examples: &lt;h1&gt;, &lt;p&gt;, &lt;a </a:t>
+            </a:r>
+            <a:r>
+              <a:rPr lang="en-US" dirty="0" err="1"/>
+              <a:t>href</a:t>
+            </a:r>
+            <a:r>
+              <a:rPr lang="en-US" dirty="0"/>
+              <a:t>=“test.html”&gt;, &lt;ul&gt;, &lt;li&gt;, &lt;div&gt;, etc.</a:t>
             </a:r>
           </a:p>
         </p:txBody>

</xml_diff>